<commit_message>
Made changes in Git& Github PPT where I added command in .gitignore folder
</commit_message>
<xml_diff>
--- a/PPTs and other documents related to training/Git & GitHub.pptx
+++ b/PPTs and other documents related to training/Git & GitHub.pptx
@@ -145,14 +145,6 @@
     </p:ext>
   </p:extLst>
 </p:presentation>
-</file>
-
-<file path=ppt/revisionInfo.xml><?xml version="1.0" encoding="utf-8"?>
-<p1510:revInfo xmlns:a="http://schemas.openxmlformats.org/drawingml/2006/main" xmlns:r="http://schemas.openxmlformats.org/officeDocument/2006/relationships" xmlns:p1510="http://schemas.microsoft.com/office/powerpoint/2015/10/main">
-  <p1510:revLst>
-    <p1510:client id="{5E901A3A-DDB2-4D65-82CE-9125D367292C}" v="61" dt="2023-04-09T08:18:28.491"/>
-  </p1510:revLst>
-</p1510:revInfo>
 </file>
 
 <file path=ppt/changesInfos/changesInfo1.xml><?xml version="1.0" encoding="utf-8"?>
@@ -1697,6 +1689,30 @@
       </pc:sldChg>
     </pc:docChg>
   </pc:docChgLst>
+  <pc:docChgLst>
+    <pc:chgData name="Shrey Bechara" userId="9059411d-b244-4d27-ad8a-c685a7523656" providerId="ADAL" clId="{0450FB67-1153-42CA-839F-BAAC58640C52}"/>
+    <pc:docChg chg="undo custSel modSld">
+      <pc:chgData name="Shrey Bechara" userId="9059411d-b244-4d27-ad8a-c685a7523656" providerId="ADAL" clId="{0450FB67-1153-42CA-839F-BAAC58640C52}" dt="2023-05-23T05:34:39.153" v="44" actId="113"/>
+      <pc:docMkLst>
+        <pc:docMk/>
+      </pc:docMkLst>
+      <pc:sldChg chg="modSp mod">
+        <pc:chgData name="Shrey Bechara" userId="9059411d-b244-4d27-ad8a-c685a7523656" providerId="ADAL" clId="{0450FB67-1153-42CA-839F-BAAC58640C52}" dt="2023-05-23T05:34:39.153" v="44" actId="113"/>
+        <pc:sldMkLst>
+          <pc:docMk/>
+          <pc:sldMk cId="4262248877" sldId="267"/>
+        </pc:sldMkLst>
+        <pc:spChg chg="mod">
+          <ac:chgData name="Shrey Bechara" userId="9059411d-b244-4d27-ad8a-c685a7523656" providerId="ADAL" clId="{0450FB67-1153-42CA-839F-BAAC58640C52}" dt="2023-05-23T05:34:39.153" v="44" actId="113"/>
+          <ac:spMkLst>
+            <pc:docMk/>
+            <pc:sldMk cId="4262248877" sldId="267"/>
+            <ac:spMk id="3" creationId="{0520FD68-6632-1980-6917-238D37F90F7F}"/>
+          </ac:spMkLst>
+        </pc:spChg>
+      </pc:sldChg>
+    </pc:docChg>
+  </pc:docChgLst>
 </pc:chgInfo>
 </file>
 
@@ -2445,7 +2461,7 @@
           <a:p>
             <a:fld id="{3135B033-1102-448D-AE9C-09FAF647E837}" type="datetimeFigureOut">
               <a:rPr lang="en-US" smtClean="0"/>
-              <a:t>4/11/2023</a:t>
+              <a:t>5/23/2023</a:t>
             </a:fld>
             <a:endParaRPr lang="en-US"/>
           </a:p>
@@ -2696,7 +2712,7 @@
           <a:p>
             <a:fld id="{3135B033-1102-448D-AE9C-09FAF647E837}" type="datetimeFigureOut">
               <a:rPr lang="en-US" smtClean="0"/>
-              <a:t>4/11/2023</a:t>
+              <a:t>5/23/2023</a:t>
             </a:fld>
             <a:endParaRPr lang="en-US"/>
           </a:p>
@@ -3010,7 +3026,7 @@
           <a:p>
             <a:fld id="{3135B033-1102-448D-AE9C-09FAF647E837}" type="datetimeFigureOut">
               <a:rPr lang="en-US" smtClean="0"/>
-              <a:t>4/11/2023</a:t>
+              <a:t>5/23/2023</a:t>
             </a:fld>
             <a:endParaRPr lang="en-US"/>
           </a:p>
@@ -3343,7 +3359,7 @@
           <a:p>
             <a:fld id="{3135B033-1102-448D-AE9C-09FAF647E837}" type="datetimeFigureOut">
               <a:rPr lang="en-US" smtClean="0"/>
-              <a:t>4/11/2023</a:t>
+              <a:t>5/23/2023</a:t>
             </a:fld>
             <a:endParaRPr lang="en-US"/>
           </a:p>
@@ -3657,7 +3673,7 @@
           <a:p>
             <a:fld id="{3135B033-1102-448D-AE9C-09FAF647E837}" type="datetimeFigureOut">
               <a:rPr lang="en-US" smtClean="0"/>
-              <a:t>4/11/2023</a:t>
+              <a:t>5/23/2023</a:t>
             </a:fld>
             <a:endParaRPr lang="en-US"/>
           </a:p>
@@ -4050,7 +4066,7 @@
           <a:p>
             <a:fld id="{3135B033-1102-448D-AE9C-09FAF647E837}" type="datetimeFigureOut">
               <a:rPr lang="en-US" smtClean="0"/>
-              <a:t>4/11/2023</a:t>
+              <a:t>5/23/2023</a:t>
             </a:fld>
             <a:endParaRPr lang="en-US"/>
           </a:p>
@@ -4220,7 +4236,7 @@
           <a:p>
             <a:fld id="{3135B033-1102-448D-AE9C-09FAF647E837}" type="datetimeFigureOut">
               <a:rPr lang="en-US" smtClean="0"/>
-              <a:t>4/11/2023</a:t>
+              <a:t>5/23/2023</a:t>
             </a:fld>
             <a:endParaRPr lang="en-US"/>
           </a:p>
@@ -4400,7 +4416,7 @@
           <a:p>
             <a:fld id="{3135B033-1102-448D-AE9C-09FAF647E837}" type="datetimeFigureOut">
               <a:rPr lang="en-US" smtClean="0"/>
-              <a:t>4/11/2023</a:t>
+              <a:t>5/23/2023</a:t>
             </a:fld>
             <a:endParaRPr lang="en-US"/>
           </a:p>
@@ -4570,7 +4586,7 @@
           <a:p>
             <a:fld id="{3135B033-1102-448D-AE9C-09FAF647E837}" type="datetimeFigureOut">
               <a:rPr lang="en-US" smtClean="0"/>
-              <a:t>4/11/2023</a:t>
+              <a:t>5/23/2023</a:t>
             </a:fld>
             <a:endParaRPr lang="en-US"/>
           </a:p>
@@ -4817,7 +4833,7 @@
           <a:p>
             <a:fld id="{3135B033-1102-448D-AE9C-09FAF647E837}" type="datetimeFigureOut">
               <a:rPr lang="en-US" smtClean="0"/>
-              <a:t>4/11/2023</a:t>
+              <a:t>5/23/2023</a:t>
             </a:fld>
             <a:endParaRPr lang="en-US"/>
           </a:p>
@@ -5049,7 +5065,7 @@
           <a:p>
             <a:fld id="{3135B033-1102-448D-AE9C-09FAF647E837}" type="datetimeFigureOut">
               <a:rPr lang="en-US" smtClean="0"/>
-              <a:t>4/11/2023</a:t>
+              <a:t>5/23/2023</a:t>
             </a:fld>
             <a:endParaRPr lang="en-US"/>
           </a:p>
@@ -5423,7 +5439,7 @@
           <a:p>
             <a:fld id="{3135B033-1102-448D-AE9C-09FAF647E837}" type="datetimeFigureOut">
               <a:rPr lang="en-US" smtClean="0"/>
-              <a:t>4/11/2023</a:t>
+              <a:t>5/23/2023</a:t>
             </a:fld>
             <a:endParaRPr lang="en-US"/>
           </a:p>
@@ -5546,7 +5562,7 @@
           <a:p>
             <a:fld id="{3135B033-1102-448D-AE9C-09FAF647E837}" type="datetimeFigureOut">
               <a:rPr lang="en-US" smtClean="0"/>
-              <a:t>4/11/2023</a:t>
+              <a:t>5/23/2023</a:t>
             </a:fld>
             <a:endParaRPr lang="en-US"/>
           </a:p>
@@ -5641,7 +5657,7 @@
           <a:p>
             <a:fld id="{3135B033-1102-448D-AE9C-09FAF647E837}" type="datetimeFigureOut">
               <a:rPr lang="en-US" smtClean="0"/>
-              <a:t>4/11/2023</a:t>
+              <a:t>5/23/2023</a:t>
             </a:fld>
             <a:endParaRPr lang="en-US"/>
           </a:p>
@@ -5896,7 +5912,7 @@
           <a:p>
             <a:fld id="{3135B033-1102-448D-AE9C-09FAF647E837}" type="datetimeFigureOut">
               <a:rPr lang="en-US" smtClean="0"/>
-              <a:t>4/11/2023</a:t>
+              <a:t>5/23/2023</a:t>
             </a:fld>
             <a:endParaRPr lang="en-US"/>
           </a:p>
@@ -6201,7 +6217,7 @@
           <a:p>
             <a:fld id="{3135B033-1102-448D-AE9C-09FAF647E837}" type="datetimeFigureOut">
               <a:rPr lang="en-US" smtClean="0"/>
-              <a:t>4/11/2023</a:t>
+              <a:t>5/23/2023</a:t>
             </a:fld>
             <a:endParaRPr lang="en-US"/>
           </a:p>
@@ -6903,7 +6919,7 @@
           <a:p>
             <a:fld id="{3135B033-1102-448D-AE9C-09FAF647E837}" type="datetimeFigureOut">
               <a:rPr lang="en-US" smtClean="0"/>
-              <a:t>4/11/2023</a:t>
+              <a:t>5/23/2023</a:t>
             </a:fld>
             <a:endParaRPr lang="en-US"/>
           </a:p>
@@ -8635,10 +8651,15 @@
             <p:ph idx="1"/>
           </p:nvPr>
         </p:nvSpPr>
-        <p:spPr/>
+        <p:spPr>
+          <a:xfrm>
+            <a:off x="677333" y="2160589"/>
+            <a:ext cx="11143192" cy="4583111"/>
+          </a:xfrm>
+        </p:spPr>
         <p:txBody>
           <a:bodyPr>
-            <a:normAutofit fontScale="92500" lnSpcReduction="10000"/>
+            <a:normAutofit/>
           </a:bodyPr>
           <a:lstStyle/>
           <a:p>
@@ -9089,6 +9110,61 @@
                 </a:solidFill>
               </a:rPr>
               <a:t> file</a:t>
+            </a:r>
+          </a:p>
+          <a:p>
+            <a:r>
+              <a:rPr lang="en-US" sz="2000" b="1" dirty="0">
+                <a:solidFill>
+                  <a:schemeClr val="tx1"/>
+                </a:solidFill>
+              </a:rPr>
+              <a:t>NOTE:</a:t>
+            </a:r>
+            <a:r>
+              <a:rPr lang="en-US" sz="2000" dirty="0">
+                <a:solidFill>
+                  <a:schemeClr val="tx1"/>
+                </a:solidFill>
+              </a:rPr>
+              <a:t> If file or folder once tracked by git and after that if we want to ignore that particular file or folder then after adding it into .</a:t>
+            </a:r>
+            <a:r>
+              <a:rPr lang="en-US" sz="2000" dirty="0" err="1">
+                <a:solidFill>
+                  <a:schemeClr val="tx1"/>
+                </a:solidFill>
+              </a:rPr>
+              <a:t>gitgnore</a:t>
+            </a:r>
+            <a:r>
+              <a:rPr lang="en-US" sz="2000" dirty="0">
+                <a:solidFill>
+                  <a:schemeClr val="tx1"/>
+                </a:solidFill>
+              </a:rPr>
+              <a:t> file we must enter this command also </a:t>
+            </a:r>
+          </a:p>
+          <a:p>
+            <a:pPr marL="0" indent="0">
+              <a:buNone/>
+            </a:pPr>
+            <a:r>
+              <a:rPr lang="en-US" sz="2000" dirty="0">
+                <a:solidFill>
+                  <a:schemeClr val="tx1"/>
+                </a:solidFill>
+              </a:rPr>
+              <a:t>     # Remove the debug folder from Git's tracking history </a:t>
+            </a:r>
+            <a:r>
+              <a:rPr lang="en-US" sz="2000" b="1" dirty="0">
+                <a:solidFill>
+                  <a:schemeClr val="tx1"/>
+                </a:solidFill>
+              </a:rPr>
+              <a:t>git rm -r --cached &lt;file/folder name&gt;</a:t>
             </a:r>
           </a:p>
           <a:p>
@@ -10259,21 +10335,8 @@
                   <a:schemeClr val="tx1"/>
                 </a:solidFill>
               </a:rPr>
-              <a:t>git branch </a:t>
-            </a:r>
-            <a:r>
-              <a:rPr lang="en-US" sz="2000" b="1">
-                <a:solidFill>
-                  <a:schemeClr val="tx1"/>
-                </a:solidFill>
-              </a:rPr>
-              <a:t>–v (-v == --verbose)</a:t>
-            </a:r>
-            <a:endParaRPr lang="en-US" sz="2000" b="1" dirty="0">
-              <a:solidFill>
-                <a:schemeClr val="tx1"/>
-              </a:solidFill>
-            </a:endParaRPr>
+              <a:t>git branch –v (-v == --verbose)</a:t>
+            </a:r>
           </a:p>
         </p:txBody>
       </p:sp>

</xml_diff>

<commit_message>
Added .metadata folder in .gitignore file in master branch
</commit_message>
<xml_diff>
--- a/PPTs and other documents related to training/Git & GitHub.pptx
+++ b/PPTs and other documents related to training/Git & GitHub.pptx
@@ -145,6 +145,14 @@
     </p:ext>
   </p:extLst>
 </p:presentation>
+</file>
+
+<file path=ppt/revisionInfo.xml><?xml version="1.0" encoding="utf-8"?>
+<p1510:revInfo xmlns:a="http://schemas.openxmlformats.org/drawingml/2006/main" xmlns:r="http://schemas.openxmlformats.org/officeDocument/2006/relationships" xmlns:p1510="http://schemas.microsoft.com/office/powerpoint/2015/10/main">
+  <p1510:revLst>
+    <p1510:client id="{5E901A3A-DDB2-4D65-82CE-9125D367292C}" v="61" dt="2023-04-09T08:18:28.491"/>
+  </p1510:revLst>
+</p1510:revInfo>
 </file>
 
 <file path=ppt/changesInfos/changesInfo1.xml><?xml version="1.0" encoding="utf-8"?>
@@ -1689,30 +1697,6 @@
       </pc:sldChg>
     </pc:docChg>
   </pc:docChgLst>
-  <pc:docChgLst>
-    <pc:chgData name="Shrey Bechara" userId="9059411d-b244-4d27-ad8a-c685a7523656" providerId="ADAL" clId="{0450FB67-1153-42CA-839F-BAAC58640C52}"/>
-    <pc:docChg chg="undo custSel modSld">
-      <pc:chgData name="Shrey Bechara" userId="9059411d-b244-4d27-ad8a-c685a7523656" providerId="ADAL" clId="{0450FB67-1153-42CA-839F-BAAC58640C52}" dt="2023-05-23T05:34:39.153" v="44" actId="113"/>
-      <pc:docMkLst>
-        <pc:docMk/>
-      </pc:docMkLst>
-      <pc:sldChg chg="modSp mod">
-        <pc:chgData name="Shrey Bechara" userId="9059411d-b244-4d27-ad8a-c685a7523656" providerId="ADAL" clId="{0450FB67-1153-42CA-839F-BAAC58640C52}" dt="2023-05-23T05:34:39.153" v="44" actId="113"/>
-        <pc:sldMkLst>
-          <pc:docMk/>
-          <pc:sldMk cId="4262248877" sldId="267"/>
-        </pc:sldMkLst>
-        <pc:spChg chg="mod">
-          <ac:chgData name="Shrey Bechara" userId="9059411d-b244-4d27-ad8a-c685a7523656" providerId="ADAL" clId="{0450FB67-1153-42CA-839F-BAAC58640C52}" dt="2023-05-23T05:34:39.153" v="44" actId="113"/>
-          <ac:spMkLst>
-            <pc:docMk/>
-            <pc:sldMk cId="4262248877" sldId="267"/>
-            <ac:spMk id="3" creationId="{0520FD68-6632-1980-6917-238D37F90F7F}"/>
-          </ac:spMkLst>
-        </pc:spChg>
-      </pc:sldChg>
-    </pc:docChg>
-  </pc:docChgLst>
 </pc:chgInfo>
 </file>
 
@@ -2461,7 +2445,7 @@
           <a:p>
             <a:fld id="{3135B033-1102-448D-AE9C-09FAF647E837}" type="datetimeFigureOut">
               <a:rPr lang="en-US" smtClean="0"/>
-              <a:t>5/23/2023</a:t>
+              <a:t>4/11/2023</a:t>
             </a:fld>
             <a:endParaRPr lang="en-US"/>
           </a:p>
@@ -2712,7 +2696,7 @@
           <a:p>
             <a:fld id="{3135B033-1102-448D-AE9C-09FAF647E837}" type="datetimeFigureOut">
               <a:rPr lang="en-US" smtClean="0"/>
-              <a:t>5/23/2023</a:t>
+              <a:t>4/11/2023</a:t>
             </a:fld>
             <a:endParaRPr lang="en-US"/>
           </a:p>
@@ -3026,7 +3010,7 @@
           <a:p>
             <a:fld id="{3135B033-1102-448D-AE9C-09FAF647E837}" type="datetimeFigureOut">
               <a:rPr lang="en-US" smtClean="0"/>
-              <a:t>5/23/2023</a:t>
+              <a:t>4/11/2023</a:t>
             </a:fld>
             <a:endParaRPr lang="en-US"/>
           </a:p>
@@ -3359,7 +3343,7 @@
           <a:p>
             <a:fld id="{3135B033-1102-448D-AE9C-09FAF647E837}" type="datetimeFigureOut">
               <a:rPr lang="en-US" smtClean="0"/>
-              <a:t>5/23/2023</a:t>
+              <a:t>4/11/2023</a:t>
             </a:fld>
             <a:endParaRPr lang="en-US"/>
           </a:p>
@@ -3673,7 +3657,7 @@
           <a:p>
             <a:fld id="{3135B033-1102-448D-AE9C-09FAF647E837}" type="datetimeFigureOut">
               <a:rPr lang="en-US" smtClean="0"/>
-              <a:t>5/23/2023</a:t>
+              <a:t>4/11/2023</a:t>
             </a:fld>
             <a:endParaRPr lang="en-US"/>
           </a:p>
@@ -4066,7 +4050,7 @@
           <a:p>
             <a:fld id="{3135B033-1102-448D-AE9C-09FAF647E837}" type="datetimeFigureOut">
               <a:rPr lang="en-US" smtClean="0"/>
-              <a:t>5/23/2023</a:t>
+              <a:t>4/11/2023</a:t>
             </a:fld>
             <a:endParaRPr lang="en-US"/>
           </a:p>
@@ -4236,7 +4220,7 @@
           <a:p>
             <a:fld id="{3135B033-1102-448D-AE9C-09FAF647E837}" type="datetimeFigureOut">
               <a:rPr lang="en-US" smtClean="0"/>
-              <a:t>5/23/2023</a:t>
+              <a:t>4/11/2023</a:t>
             </a:fld>
             <a:endParaRPr lang="en-US"/>
           </a:p>
@@ -4416,7 +4400,7 @@
           <a:p>
             <a:fld id="{3135B033-1102-448D-AE9C-09FAF647E837}" type="datetimeFigureOut">
               <a:rPr lang="en-US" smtClean="0"/>
-              <a:t>5/23/2023</a:t>
+              <a:t>4/11/2023</a:t>
             </a:fld>
             <a:endParaRPr lang="en-US"/>
           </a:p>
@@ -4586,7 +4570,7 @@
           <a:p>
             <a:fld id="{3135B033-1102-448D-AE9C-09FAF647E837}" type="datetimeFigureOut">
               <a:rPr lang="en-US" smtClean="0"/>
-              <a:t>5/23/2023</a:t>
+              <a:t>4/11/2023</a:t>
             </a:fld>
             <a:endParaRPr lang="en-US"/>
           </a:p>
@@ -4833,7 +4817,7 @@
           <a:p>
             <a:fld id="{3135B033-1102-448D-AE9C-09FAF647E837}" type="datetimeFigureOut">
               <a:rPr lang="en-US" smtClean="0"/>
-              <a:t>5/23/2023</a:t>
+              <a:t>4/11/2023</a:t>
             </a:fld>
             <a:endParaRPr lang="en-US"/>
           </a:p>
@@ -5065,7 +5049,7 @@
           <a:p>
             <a:fld id="{3135B033-1102-448D-AE9C-09FAF647E837}" type="datetimeFigureOut">
               <a:rPr lang="en-US" smtClean="0"/>
-              <a:t>5/23/2023</a:t>
+              <a:t>4/11/2023</a:t>
             </a:fld>
             <a:endParaRPr lang="en-US"/>
           </a:p>
@@ -5439,7 +5423,7 @@
           <a:p>
             <a:fld id="{3135B033-1102-448D-AE9C-09FAF647E837}" type="datetimeFigureOut">
               <a:rPr lang="en-US" smtClean="0"/>
-              <a:t>5/23/2023</a:t>
+              <a:t>4/11/2023</a:t>
             </a:fld>
             <a:endParaRPr lang="en-US"/>
           </a:p>
@@ -5562,7 +5546,7 @@
           <a:p>
             <a:fld id="{3135B033-1102-448D-AE9C-09FAF647E837}" type="datetimeFigureOut">
               <a:rPr lang="en-US" smtClean="0"/>
-              <a:t>5/23/2023</a:t>
+              <a:t>4/11/2023</a:t>
             </a:fld>
             <a:endParaRPr lang="en-US"/>
           </a:p>
@@ -5657,7 +5641,7 @@
           <a:p>
             <a:fld id="{3135B033-1102-448D-AE9C-09FAF647E837}" type="datetimeFigureOut">
               <a:rPr lang="en-US" smtClean="0"/>
-              <a:t>5/23/2023</a:t>
+              <a:t>4/11/2023</a:t>
             </a:fld>
             <a:endParaRPr lang="en-US"/>
           </a:p>
@@ -5912,7 +5896,7 @@
           <a:p>
             <a:fld id="{3135B033-1102-448D-AE9C-09FAF647E837}" type="datetimeFigureOut">
               <a:rPr lang="en-US" smtClean="0"/>
-              <a:t>5/23/2023</a:t>
+              <a:t>4/11/2023</a:t>
             </a:fld>
             <a:endParaRPr lang="en-US"/>
           </a:p>
@@ -6217,7 +6201,7 @@
           <a:p>
             <a:fld id="{3135B033-1102-448D-AE9C-09FAF647E837}" type="datetimeFigureOut">
               <a:rPr lang="en-US" smtClean="0"/>
-              <a:t>5/23/2023</a:t>
+              <a:t>4/11/2023</a:t>
             </a:fld>
             <a:endParaRPr lang="en-US"/>
           </a:p>
@@ -6919,7 +6903,7 @@
           <a:p>
             <a:fld id="{3135B033-1102-448D-AE9C-09FAF647E837}" type="datetimeFigureOut">
               <a:rPr lang="en-US" smtClean="0"/>
-              <a:t>5/23/2023</a:t>
+              <a:t>4/11/2023</a:t>
             </a:fld>
             <a:endParaRPr lang="en-US"/>
           </a:p>
@@ -8651,15 +8635,10 @@
             <p:ph idx="1"/>
           </p:nvPr>
         </p:nvSpPr>
-        <p:spPr>
-          <a:xfrm>
-            <a:off x="677333" y="2160589"/>
-            <a:ext cx="11143192" cy="4583111"/>
-          </a:xfrm>
-        </p:spPr>
+        <p:spPr/>
         <p:txBody>
           <a:bodyPr>
-            <a:normAutofit/>
+            <a:normAutofit fontScale="92500" lnSpcReduction="10000"/>
           </a:bodyPr>
           <a:lstStyle/>
           <a:p>
@@ -9110,61 +9089,6 @@
                 </a:solidFill>
               </a:rPr>
               <a:t> file</a:t>
-            </a:r>
-          </a:p>
-          <a:p>
-            <a:r>
-              <a:rPr lang="en-US" sz="2000" b="1" dirty="0">
-                <a:solidFill>
-                  <a:schemeClr val="tx1"/>
-                </a:solidFill>
-              </a:rPr>
-              <a:t>NOTE:</a:t>
-            </a:r>
-            <a:r>
-              <a:rPr lang="en-US" sz="2000" dirty="0">
-                <a:solidFill>
-                  <a:schemeClr val="tx1"/>
-                </a:solidFill>
-              </a:rPr>
-              <a:t> If file or folder once tracked by git and after that if we want to ignore that particular file or folder then after adding it into .</a:t>
-            </a:r>
-            <a:r>
-              <a:rPr lang="en-US" sz="2000" dirty="0" err="1">
-                <a:solidFill>
-                  <a:schemeClr val="tx1"/>
-                </a:solidFill>
-              </a:rPr>
-              <a:t>gitgnore</a:t>
-            </a:r>
-            <a:r>
-              <a:rPr lang="en-US" sz="2000" dirty="0">
-                <a:solidFill>
-                  <a:schemeClr val="tx1"/>
-                </a:solidFill>
-              </a:rPr>
-              <a:t> file we must enter this command also </a:t>
-            </a:r>
-          </a:p>
-          <a:p>
-            <a:pPr marL="0" indent="0">
-              <a:buNone/>
-            </a:pPr>
-            <a:r>
-              <a:rPr lang="en-US" sz="2000" dirty="0">
-                <a:solidFill>
-                  <a:schemeClr val="tx1"/>
-                </a:solidFill>
-              </a:rPr>
-              <a:t>     # Remove the debug folder from Git's tracking history </a:t>
-            </a:r>
-            <a:r>
-              <a:rPr lang="en-US" sz="2000" b="1" dirty="0">
-                <a:solidFill>
-                  <a:schemeClr val="tx1"/>
-                </a:solidFill>
-              </a:rPr>
-              <a:t>git rm -r --cached &lt;file/folder name&gt;</a:t>
             </a:r>
           </a:p>
           <a:p>
@@ -10335,8 +10259,21 @@
                   <a:schemeClr val="tx1"/>
                 </a:solidFill>
               </a:rPr>
-              <a:t>git branch –v (-v == --verbose)</a:t>
-            </a:r>
+              <a:t>git branch </a:t>
+            </a:r>
+            <a:r>
+              <a:rPr lang="en-US" sz="2000" b="1">
+                <a:solidFill>
+                  <a:schemeClr val="tx1"/>
+                </a:solidFill>
+              </a:rPr>
+              <a:t>–v (-v == --verbose)</a:t>
+            </a:r>
+            <a:endParaRPr lang="en-US" sz="2000" b="1" dirty="0">
+              <a:solidFill>
+                <a:schemeClr val="tx1"/>
+              </a:solidFill>
+            </a:endParaRPr>
           </a:p>
         </p:txBody>
       </p:sp>

</xml_diff>

<commit_message>
Done all necessary changes like added #error directive and removed WatchdogFeed() function
</commit_message>
<xml_diff>
--- a/PPTs and other documents related to training/Git & GitHub.pptx
+++ b/PPTs and other documents related to training/Git & GitHub.pptx
@@ -7,14 +7,14 @@
   <p:sldIdLst>
     <p:sldId id="256" r:id="rId2"/>
     <p:sldId id="257" r:id="rId3"/>
-    <p:sldId id="258" r:id="rId4"/>
-    <p:sldId id="259" r:id="rId5"/>
-    <p:sldId id="260" r:id="rId6"/>
-    <p:sldId id="261" r:id="rId7"/>
-    <p:sldId id="262" r:id="rId8"/>
-    <p:sldId id="263" r:id="rId9"/>
-    <p:sldId id="264" r:id="rId10"/>
-    <p:sldId id="265" r:id="rId11"/>
+    <p:sldId id="259" r:id="rId4"/>
+    <p:sldId id="260" r:id="rId5"/>
+    <p:sldId id="261" r:id="rId6"/>
+    <p:sldId id="262" r:id="rId7"/>
+    <p:sldId id="263" r:id="rId8"/>
+    <p:sldId id="264" r:id="rId9"/>
+    <p:sldId id="265" r:id="rId10"/>
+    <p:sldId id="258" r:id="rId11"/>
     <p:sldId id="266" r:id="rId12"/>
     <p:sldId id="267" r:id="rId13"/>
     <p:sldId id="268" r:id="rId14"/>
@@ -145,14 +145,6 @@
     </p:ext>
   </p:extLst>
 </p:presentation>
-</file>
-
-<file path=ppt/revisionInfo.xml><?xml version="1.0" encoding="utf-8"?>
-<p1510:revInfo xmlns:a="http://schemas.openxmlformats.org/drawingml/2006/main" xmlns:r="http://schemas.openxmlformats.org/officeDocument/2006/relationships" xmlns:p1510="http://schemas.microsoft.com/office/powerpoint/2015/10/main">
-  <p1510:revLst>
-    <p1510:client id="{5E901A3A-DDB2-4D65-82CE-9125D367292C}" v="61" dt="2023-04-09T08:18:28.491"/>
-  </p1510:revLst>
-</p1510:revInfo>
 </file>
 
 <file path=ppt/changesInfos/changesInfo1.xml><?xml version="1.0" encoding="utf-8"?>
@@ -1697,6 +1689,22 @@
       </pc:sldChg>
     </pc:docChg>
   </pc:docChgLst>
+  <pc:docChgLst>
+    <pc:chgData name="Shrey Bechara" userId="9059411d-b244-4d27-ad8a-c685a7523656" providerId="ADAL" clId="{0450FB67-1153-42CA-839F-BAAC58640C52}"/>
+    <pc:docChg chg="modSld sldOrd">
+      <pc:chgData name="Shrey Bechara" userId="9059411d-b244-4d27-ad8a-c685a7523656" providerId="ADAL" clId="{0450FB67-1153-42CA-839F-BAAC58640C52}" dt="2023-06-05T06:06:34.509" v="1"/>
+      <pc:docMkLst>
+        <pc:docMk/>
+      </pc:docMkLst>
+      <pc:sldChg chg="ord">
+        <pc:chgData name="Shrey Bechara" userId="9059411d-b244-4d27-ad8a-c685a7523656" providerId="ADAL" clId="{0450FB67-1153-42CA-839F-BAAC58640C52}" dt="2023-06-05T06:06:34.509" v="1"/>
+        <pc:sldMkLst>
+          <pc:docMk/>
+          <pc:sldMk cId="1780461939" sldId="258"/>
+        </pc:sldMkLst>
+      </pc:sldChg>
+    </pc:docChg>
+  </pc:docChgLst>
 </pc:chgInfo>
 </file>
 
@@ -2445,7 +2453,7 @@
           <a:p>
             <a:fld id="{3135B033-1102-448D-AE9C-09FAF647E837}" type="datetimeFigureOut">
               <a:rPr lang="en-US" smtClean="0"/>
-              <a:t>4/11/2023</a:t>
+              <a:t>6/5/2023</a:t>
             </a:fld>
             <a:endParaRPr lang="en-US"/>
           </a:p>
@@ -2696,7 +2704,7 @@
           <a:p>
             <a:fld id="{3135B033-1102-448D-AE9C-09FAF647E837}" type="datetimeFigureOut">
               <a:rPr lang="en-US" smtClean="0"/>
-              <a:t>4/11/2023</a:t>
+              <a:t>6/5/2023</a:t>
             </a:fld>
             <a:endParaRPr lang="en-US"/>
           </a:p>
@@ -3010,7 +3018,7 @@
           <a:p>
             <a:fld id="{3135B033-1102-448D-AE9C-09FAF647E837}" type="datetimeFigureOut">
               <a:rPr lang="en-US" smtClean="0"/>
-              <a:t>4/11/2023</a:t>
+              <a:t>6/5/2023</a:t>
             </a:fld>
             <a:endParaRPr lang="en-US"/>
           </a:p>
@@ -3343,7 +3351,7 @@
           <a:p>
             <a:fld id="{3135B033-1102-448D-AE9C-09FAF647E837}" type="datetimeFigureOut">
               <a:rPr lang="en-US" smtClean="0"/>
-              <a:t>4/11/2023</a:t>
+              <a:t>6/5/2023</a:t>
             </a:fld>
             <a:endParaRPr lang="en-US"/>
           </a:p>
@@ -3657,7 +3665,7 @@
           <a:p>
             <a:fld id="{3135B033-1102-448D-AE9C-09FAF647E837}" type="datetimeFigureOut">
               <a:rPr lang="en-US" smtClean="0"/>
-              <a:t>4/11/2023</a:t>
+              <a:t>6/5/2023</a:t>
             </a:fld>
             <a:endParaRPr lang="en-US"/>
           </a:p>
@@ -4050,7 +4058,7 @@
           <a:p>
             <a:fld id="{3135B033-1102-448D-AE9C-09FAF647E837}" type="datetimeFigureOut">
               <a:rPr lang="en-US" smtClean="0"/>
-              <a:t>4/11/2023</a:t>
+              <a:t>6/5/2023</a:t>
             </a:fld>
             <a:endParaRPr lang="en-US"/>
           </a:p>
@@ -4220,7 +4228,7 @@
           <a:p>
             <a:fld id="{3135B033-1102-448D-AE9C-09FAF647E837}" type="datetimeFigureOut">
               <a:rPr lang="en-US" smtClean="0"/>
-              <a:t>4/11/2023</a:t>
+              <a:t>6/5/2023</a:t>
             </a:fld>
             <a:endParaRPr lang="en-US"/>
           </a:p>
@@ -4400,7 +4408,7 @@
           <a:p>
             <a:fld id="{3135B033-1102-448D-AE9C-09FAF647E837}" type="datetimeFigureOut">
               <a:rPr lang="en-US" smtClean="0"/>
-              <a:t>4/11/2023</a:t>
+              <a:t>6/5/2023</a:t>
             </a:fld>
             <a:endParaRPr lang="en-US"/>
           </a:p>
@@ -4570,7 +4578,7 @@
           <a:p>
             <a:fld id="{3135B033-1102-448D-AE9C-09FAF647E837}" type="datetimeFigureOut">
               <a:rPr lang="en-US" smtClean="0"/>
-              <a:t>4/11/2023</a:t>
+              <a:t>6/5/2023</a:t>
             </a:fld>
             <a:endParaRPr lang="en-US"/>
           </a:p>
@@ -4817,7 +4825,7 @@
           <a:p>
             <a:fld id="{3135B033-1102-448D-AE9C-09FAF647E837}" type="datetimeFigureOut">
               <a:rPr lang="en-US" smtClean="0"/>
-              <a:t>4/11/2023</a:t>
+              <a:t>6/5/2023</a:t>
             </a:fld>
             <a:endParaRPr lang="en-US"/>
           </a:p>
@@ -5049,7 +5057,7 @@
           <a:p>
             <a:fld id="{3135B033-1102-448D-AE9C-09FAF647E837}" type="datetimeFigureOut">
               <a:rPr lang="en-US" smtClean="0"/>
-              <a:t>4/11/2023</a:t>
+              <a:t>6/5/2023</a:t>
             </a:fld>
             <a:endParaRPr lang="en-US"/>
           </a:p>
@@ -5423,7 +5431,7 @@
           <a:p>
             <a:fld id="{3135B033-1102-448D-AE9C-09FAF647E837}" type="datetimeFigureOut">
               <a:rPr lang="en-US" smtClean="0"/>
-              <a:t>4/11/2023</a:t>
+              <a:t>6/5/2023</a:t>
             </a:fld>
             <a:endParaRPr lang="en-US"/>
           </a:p>
@@ -5546,7 +5554,7 @@
           <a:p>
             <a:fld id="{3135B033-1102-448D-AE9C-09FAF647E837}" type="datetimeFigureOut">
               <a:rPr lang="en-US" smtClean="0"/>
-              <a:t>4/11/2023</a:t>
+              <a:t>6/5/2023</a:t>
             </a:fld>
             <a:endParaRPr lang="en-US"/>
           </a:p>
@@ -5641,7 +5649,7 @@
           <a:p>
             <a:fld id="{3135B033-1102-448D-AE9C-09FAF647E837}" type="datetimeFigureOut">
               <a:rPr lang="en-US" smtClean="0"/>
-              <a:t>4/11/2023</a:t>
+              <a:t>6/5/2023</a:t>
             </a:fld>
             <a:endParaRPr lang="en-US"/>
           </a:p>
@@ -5896,7 +5904,7 @@
           <a:p>
             <a:fld id="{3135B033-1102-448D-AE9C-09FAF647E837}" type="datetimeFigureOut">
               <a:rPr lang="en-US" smtClean="0"/>
-              <a:t>4/11/2023</a:t>
+              <a:t>6/5/2023</a:t>
             </a:fld>
             <a:endParaRPr lang="en-US"/>
           </a:p>
@@ -6201,7 +6209,7 @@
           <a:p>
             <a:fld id="{3135B033-1102-448D-AE9C-09FAF647E837}" type="datetimeFigureOut">
               <a:rPr lang="en-US" smtClean="0"/>
-              <a:t>4/11/2023</a:t>
+              <a:t>6/5/2023</a:t>
             </a:fld>
             <a:endParaRPr lang="en-US"/>
           </a:p>
@@ -6903,7 +6911,7 @@
           <a:p>
             <a:fld id="{3135B033-1102-448D-AE9C-09FAF647E837}" type="datetimeFigureOut">
               <a:rPr lang="en-US" smtClean="0"/>
-              <a:t>4/11/2023</a:t>
+              <a:t>6/5/2023</a:t>
             </a:fld>
             <a:endParaRPr lang="en-US"/>
           </a:p>
@@ -7554,7 +7562,7 @@
           <p:cNvPr id="2" name="Title 1">
             <a:extLst>
               <a:ext uri="{FF2B5EF4-FFF2-40B4-BE49-F238E27FC236}">
-                <a16:creationId xmlns:a16="http://schemas.microsoft.com/office/drawing/2014/main" id="{2D6F5181-1625-3335-5685-9DEBC9C63E2D}"/>
+                <a16:creationId xmlns:a16="http://schemas.microsoft.com/office/drawing/2014/main" id="{FF2D9F84-E9FA-C06E-168B-5CF01F092B80}"/>
               </a:ext>
             </a:extLst>
           </p:cNvPr>
@@ -7567,23 +7575,28 @@
         </p:nvSpPr>
         <p:spPr/>
         <p:txBody>
-          <a:bodyPr/>
+          <a:bodyPr>
+            <a:normAutofit/>
+          </a:bodyPr>
           <a:lstStyle/>
           <a:p>
             <a:pPr algn="ctr"/>
             <a:r>
-              <a:rPr lang="en-US" dirty="0"/>
-              <a:t>Other command</a:t>
-            </a:r>
-          </a:p>
-        </p:txBody>
-      </p:sp>
-      <p:sp>
-        <p:nvSpPr>
-          <p:cNvPr id="4" name="Content Placeholder 3">
+              <a:rPr lang="en-US" dirty="0">
+                <a:latin typeface="+mn-lt"/>
+                <a:cs typeface="Times New Roman" panose="02020603050405020304" pitchFamily="18" charset="0"/>
+              </a:rPr>
+              <a:t>History of Version Control System</a:t>
+            </a:r>
+          </a:p>
+        </p:txBody>
+      </p:sp>
+      <p:sp>
+        <p:nvSpPr>
+          <p:cNvPr id="3" name="Content Placeholder 2">
             <a:extLst>
               <a:ext uri="{FF2B5EF4-FFF2-40B4-BE49-F238E27FC236}">
-                <a16:creationId xmlns:a16="http://schemas.microsoft.com/office/drawing/2014/main" id="{A543A87A-F3D3-EA4C-79CA-76BA4A7D3E0C}"/>
+                <a16:creationId xmlns:a16="http://schemas.microsoft.com/office/drawing/2014/main" id="{9E88D14C-E384-4A17-079A-BA8358548681}"/>
               </a:ext>
             </a:extLst>
           </p:cNvPr>
@@ -7591,7 +7604,7 @@
             <a:spLocks noGrp="1"/>
           </p:cNvSpPr>
           <p:nvPr>
-            <p:ph sz="half" idx="2"/>
+            <p:ph idx="1"/>
           </p:nvPr>
         </p:nvSpPr>
         <p:spPr/>
@@ -7601,56 +7614,48 @@
           </a:bodyPr>
           <a:lstStyle/>
           <a:p>
-            <a:pPr marL="457200" indent="-457200">
-              <a:buFont typeface="+mj-lt"/>
-              <a:buAutoNum type="arabicPeriod"/>
+            <a:pPr>
+              <a:buFont typeface="Wingdings" panose="05000000000000000000" pitchFamily="2" charset="2"/>
+              <a:buChar char="Ø"/>
             </a:pPr>
             <a:r>
-              <a:rPr lang="en-US" sz="2000" b="1" dirty="0">
-                <a:solidFill>
-                  <a:schemeClr val="tx1"/>
-                </a:solidFill>
-              </a:rPr>
-              <a:t>git clone (link(copy paste))</a:t>
-            </a:r>
-          </a:p>
-        </p:txBody>
-      </p:sp>
-      <p:sp>
-        <p:nvSpPr>
-          <p:cNvPr id="6" name="Content Placeholder 5">
-            <a:extLst>
-              <a:ext uri="{FF2B5EF4-FFF2-40B4-BE49-F238E27FC236}">
-                <a16:creationId xmlns:a16="http://schemas.microsoft.com/office/drawing/2014/main" id="{B0EC5ACA-21C0-1EAF-FA95-4DF2F83F7C33}"/>
-              </a:ext>
-            </a:extLst>
-          </p:cNvPr>
-          <p:cNvSpPr>
-            <a:spLocks noGrp="1"/>
-          </p:cNvSpPr>
-          <p:nvPr>
-            <p:ph sz="quarter" idx="4"/>
-          </p:nvPr>
-        </p:nvSpPr>
-        <p:spPr>
-          <a:xfrm>
-            <a:off x="5088384" y="2737245"/>
-            <a:ext cx="6894066" cy="3304117"/>
-          </a:xfrm>
-        </p:spPr>
-        <p:txBody>
-          <a:bodyPr>
-            <a:normAutofit/>
-          </a:bodyPr>
-          <a:lstStyle/>
-          <a:p>
-            <a:r>
               <a:rPr lang="en-US" sz="2000" dirty="0">
                 <a:solidFill>
                   <a:schemeClr val="tx1"/>
                 </a:solidFill>
-              </a:rPr>
-              <a:t>To copy existing repository to your repository</a:t>
+                <a:cs typeface="Times New Roman" panose="02020603050405020304" pitchFamily="18" charset="0"/>
+              </a:rPr>
+              <a:t>Local Version Control System.</a:t>
+            </a:r>
+          </a:p>
+          <a:p>
+            <a:pPr>
+              <a:buFont typeface="Wingdings" panose="05000000000000000000" pitchFamily="2" charset="2"/>
+              <a:buChar char="Ø"/>
+            </a:pPr>
+            <a:r>
+              <a:rPr lang="en-US" sz="2000" dirty="0">
+                <a:solidFill>
+                  <a:schemeClr val="tx1"/>
+                </a:solidFill>
+                <a:cs typeface="Times New Roman" panose="02020603050405020304" pitchFamily="18" charset="0"/>
+              </a:rPr>
+              <a:t>Centralized Version Control System.</a:t>
+            </a:r>
+          </a:p>
+          <a:p>
+            <a:pPr>
+              <a:buFont typeface="Wingdings" panose="05000000000000000000" pitchFamily="2" charset="2"/>
+              <a:buChar char="Ø"/>
+            </a:pPr>
+            <a:r>
+              <a:rPr lang="en-US" sz="2000" dirty="0">
+                <a:solidFill>
+                  <a:schemeClr val="tx1"/>
+                </a:solidFill>
+                <a:cs typeface="Times New Roman" panose="02020603050405020304" pitchFamily="18" charset="0"/>
+              </a:rPr>
+              <a:t>Distributed Version Control System(like git).</a:t>
             </a:r>
           </a:p>
         </p:txBody>
@@ -7658,7 +7663,7 @@
     </p:spTree>
     <p:extLst>
       <p:ext uri="{BB962C8B-B14F-4D97-AF65-F5344CB8AC3E}">
-        <p14:creationId xmlns:p14="http://schemas.microsoft.com/office/powerpoint/2010/main" val="2999541459"/>
+        <p14:creationId xmlns:p14="http://schemas.microsoft.com/office/powerpoint/2010/main" val="1780461939"/>
       </p:ext>
     </p:extLst>
   </p:cSld>
@@ -15459,7 +15464,7 @@
           <p:cNvPr id="2" name="Title 1">
             <a:extLst>
               <a:ext uri="{FF2B5EF4-FFF2-40B4-BE49-F238E27FC236}">
-                <a16:creationId xmlns:a16="http://schemas.microsoft.com/office/drawing/2014/main" id="{FF2D9F84-E9FA-C06E-168B-5CF01F092B80}"/>
+                <a16:creationId xmlns:a16="http://schemas.microsoft.com/office/drawing/2014/main" id="{CAD0F4DE-A9B6-C908-A532-893EA49F9768}"/>
               </a:ext>
             </a:extLst>
           </p:cNvPr>
@@ -15480,10 +15485,9 @@
             <a:pPr algn="ctr"/>
             <a:r>
               <a:rPr lang="en-US" dirty="0">
-                <a:latin typeface="+mn-lt"/>
                 <a:cs typeface="Times New Roman" panose="02020603050405020304" pitchFamily="18" charset="0"/>
               </a:rPr>
-              <a:t>History of Version Control System</a:t>
+              <a:t>Git Features</a:t>
             </a:r>
           </a:p>
         </p:txBody>
@@ -15493,7 +15497,7 @@
           <p:cNvPr id="3" name="Content Placeholder 2">
             <a:extLst>
               <a:ext uri="{FF2B5EF4-FFF2-40B4-BE49-F238E27FC236}">
-                <a16:creationId xmlns:a16="http://schemas.microsoft.com/office/drawing/2014/main" id="{9E88D14C-E384-4A17-079A-BA8358548681}"/>
+                <a16:creationId xmlns:a16="http://schemas.microsoft.com/office/drawing/2014/main" id="{17800BDC-46C1-CA51-1E15-CE9A7C6B2C20}"/>
               </a:ext>
             </a:extLst>
           </p:cNvPr>
@@ -15522,7 +15526,21 @@
                 </a:solidFill>
                 <a:cs typeface="Times New Roman" panose="02020603050405020304" pitchFamily="18" charset="0"/>
               </a:rPr>
-              <a:t>Local Version Control System.</a:t>
+              <a:t>Snapshot is captured.</a:t>
+            </a:r>
+          </a:p>
+          <a:p>
+            <a:pPr marL="0" indent="0">
+              <a:buNone/>
+            </a:pPr>
+            <a:r>
+              <a:rPr lang="en-US" sz="2000" dirty="0">
+                <a:solidFill>
+                  <a:schemeClr val="tx1"/>
+                </a:solidFill>
+                <a:cs typeface="Times New Roman" panose="02020603050405020304" pitchFamily="18" charset="0"/>
+              </a:rPr>
+              <a:t>.git folder is created where history of a project/files version is stored(invisible folder in a working directory).</a:t>
             </a:r>
           </a:p>
           <a:p>
@@ -15537,7 +15555,7 @@
                 </a:solidFill>
                 <a:cs typeface="Times New Roman" panose="02020603050405020304" pitchFamily="18" charset="0"/>
               </a:rPr>
-              <a:t>Centralized Version Control System.</a:t>
+              <a:t>Almost every operation is local.</a:t>
             </a:r>
           </a:p>
           <a:p>
@@ -15552,7 +15570,22 @@
                 </a:solidFill>
                 <a:cs typeface="Times New Roman" panose="02020603050405020304" pitchFamily="18" charset="0"/>
               </a:rPr>
-              <a:t>Distributed Version Control System(like git).</a:t>
+              <a:t>Git has Integrity(i.e. every file have different checksum(i.e. unique string)).</a:t>
+            </a:r>
+          </a:p>
+          <a:p>
+            <a:pPr>
+              <a:buFont typeface="Wingdings" panose="05000000000000000000" pitchFamily="2" charset="2"/>
+              <a:buChar char="Ø"/>
+            </a:pPr>
+            <a:r>
+              <a:rPr lang="en-US" sz="2000" dirty="0">
+                <a:solidFill>
+                  <a:schemeClr val="tx1"/>
+                </a:solidFill>
+                <a:cs typeface="Times New Roman" panose="02020603050405020304" pitchFamily="18" charset="0"/>
+              </a:rPr>
+              <a:t>Git generally only adds data.</a:t>
             </a:r>
           </a:p>
         </p:txBody>
@@ -15560,7 +15593,7 @@
     </p:spTree>
     <p:extLst>
       <p:ext uri="{BB962C8B-B14F-4D97-AF65-F5344CB8AC3E}">
-        <p14:creationId xmlns:p14="http://schemas.microsoft.com/office/powerpoint/2010/main" val="1780461939"/>
+        <p14:creationId xmlns:p14="http://schemas.microsoft.com/office/powerpoint/2010/main" val="2082089090"/>
       </p:ext>
     </p:extLst>
   </p:cSld>
@@ -17985,7 +18018,7 @@
           <p:cNvPr id="2" name="Title 1">
             <a:extLst>
               <a:ext uri="{FF2B5EF4-FFF2-40B4-BE49-F238E27FC236}">
-                <a16:creationId xmlns:a16="http://schemas.microsoft.com/office/drawing/2014/main" id="{CAD0F4DE-A9B6-C908-A532-893EA49F9768}"/>
+                <a16:creationId xmlns:a16="http://schemas.microsoft.com/office/drawing/2014/main" id="{C566ADFD-99F0-C9A1-3DC1-57CAEB3749CA}"/>
               </a:ext>
             </a:extLst>
           </p:cNvPr>
@@ -18006,9 +18039,10 @@
             <a:pPr algn="ctr"/>
             <a:r>
               <a:rPr lang="en-US" dirty="0">
+                <a:latin typeface="+mn-lt"/>
                 <a:cs typeface="Times New Roman" panose="02020603050405020304" pitchFamily="18" charset="0"/>
               </a:rPr>
-              <a:t>Git Features</a:t>
+              <a:t>Prerequisites</a:t>
             </a:r>
           </a:p>
         </p:txBody>
@@ -18018,7 +18052,7 @@
           <p:cNvPr id="3" name="Content Placeholder 2">
             <a:extLst>
               <a:ext uri="{FF2B5EF4-FFF2-40B4-BE49-F238E27FC236}">
-                <a16:creationId xmlns:a16="http://schemas.microsoft.com/office/drawing/2014/main" id="{17800BDC-46C1-CA51-1E15-CE9A7C6B2C20}"/>
+                <a16:creationId xmlns:a16="http://schemas.microsoft.com/office/drawing/2014/main" id="{4696C7BD-FD93-F06F-CEAA-1DBDF1303D87}"/>
               </a:ext>
             </a:extLst>
           </p:cNvPr>
@@ -18036,10 +18070,6 @@
           </a:bodyPr>
           <a:lstStyle/>
           <a:p>
-            <a:pPr>
-              <a:buFont typeface="Wingdings" panose="05000000000000000000" pitchFamily="2" charset="2"/>
-              <a:buChar char="Ø"/>
-            </a:pPr>
             <a:r>
               <a:rPr lang="en-US" sz="2000" dirty="0">
                 <a:solidFill>
@@ -18047,13 +18077,17 @@
                 </a:solidFill>
                 <a:cs typeface="Times New Roman" panose="02020603050405020304" pitchFamily="18" charset="0"/>
               </a:rPr>
-              <a:t>Snapshot is captured.</a:t>
-            </a:r>
-          </a:p>
-          <a:p>
-            <a:pPr marL="0" indent="0">
-              <a:buNone/>
-            </a:pPr>
+              <a:t>To use git more effectively it is always advised to know some basic commands of the Linux like </a:t>
+            </a:r>
+            <a:r>
+              <a:rPr lang="en-US" sz="2000" b="1" dirty="0">
+                <a:solidFill>
+                  <a:schemeClr val="tx1"/>
+                </a:solidFill>
+                <a:cs typeface="Times New Roman" panose="02020603050405020304" pitchFamily="18" charset="0"/>
+              </a:rPr>
+              <a:t>pwd, cd, ls</a:t>
+            </a:r>
             <a:r>
               <a:rPr lang="en-US" sz="2000" dirty="0">
                 <a:solidFill>
@@ -18061,14 +18095,10 @@
                 </a:solidFill>
                 <a:cs typeface="Times New Roman" panose="02020603050405020304" pitchFamily="18" charset="0"/>
               </a:rPr>
-              <a:t>.git folder is created where history of a project/files version is stored(invisible folder in a working directory).</a:t>
-            </a:r>
-          </a:p>
-          <a:p>
-            <a:pPr>
-              <a:buFont typeface="Wingdings" panose="05000000000000000000" pitchFamily="2" charset="2"/>
-              <a:buChar char="Ø"/>
-            </a:pPr>
+              <a:t> etc.</a:t>
+            </a:r>
+          </a:p>
+          <a:p>
             <a:r>
               <a:rPr lang="en-US" sz="2000" dirty="0">
                 <a:solidFill>
@@ -18076,37 +18106,7 @@
                 </a:solidFill>
                 <a:cs typeface="Times New Roman" panose="02020603050405020304" pitchFamily="18" charset="0"/>
               </a:rPr>
-              <a:t>Almost every operation is local.</a:t>
-            </a:r>
-          </a:p>
-          <a:p>
-            <a:pPr>
-              <a:buFont typeface="Wingdings" panose="05000000000000000000" pitchFamily="2" charset="2"/>
-              <a:buChar char="Ø"/>
-            </a:pPr>
-            <a:r>
-              <a:rPr lang="en-US" sz="2000" dirty="0">
-                <a:solidFill>
-                  <a:schemeClr val="tx1"/>
-                </a:solidFill>
-                <a:cs typeface="Times New Roman" panose="02020603050405020304" pitchFamily="18" charset="0"/>
-              </a:rPr>
-              <a:t>Git has Integrity(i.e. every file have different checksum(i.e. unique string)).</a:t>
-            </a:r>
-          </a:p>
-          <a:p>
-            <a:pPr>
-              <a:buFont typeface="Wingdings" panose="05000000000000000000" pitchFamily="2" charset="2"/>
-              <a:buChar char="Ø"/>
-            </a:pPr>
-            <a:r>
-              <a:rPr lang="en-US" sz="2000" dirty="0">
-                <a:solidFill>
-                  <a:schemeClr val="tx1"/>
-                </a:solidFill>
-                <a:cs typeface="Times New Roman" panose="02020603050405020304" pitchFamily="18" charset="0"/>
-              </a:rPr>
-              <a:t>Git generally only adds data.</a:t>
+              <a:t>Git should be installed in a machine.</a:t>
             </a:r>
           </a:p>
         </p:txBody>
@@ -18114,7 +18114,7 @@
     </p:spTree>
     <p:extLst>
       <p:ext uri="{BB962C8B-B14F-4D97-AF65-F5344CB8AC3E}">
-        <p14:creationId xmlns:p14="http://schemas.microsoft.com/office/powerpoint/2010/main" val="2082089090"/>
+        <p14:creationId xmlns:p14="http://schemas.microsoft.com/office/powerpoint/2010/main" val="4026250420"/>
       </p:ext>
     </p:extLst>
   </p:cSld>
@@ -18146,134 +18146,6 @@
           <p:cNvPr id="2" name="Title 1">
             <a:extLst>
               <a:ext uri="{FF2B5EF4-FFF2-40B4-BE49-F238E27FC236}">
-                <a16:creationId xmlns:a16="http://schemas.microsoft.com/office/drawing/2014/main" id="{C566ADFD-99F0-C9A1-3DC1-57CAEB3749CA}"/>
-              </a:ext>
-            </a:extLst>
-          </p:cNvPr>
-          <p:cNvSpPr>
-            <a:spLocks noGrp="1"/>
-          </p:cNvSpPr>
-          <p:nvPr>
-            <p:ph type="title"/>
-          </p:nvPr>
-        </p:nvSpPr>
-        <p:spPr/>
-        <p:txBody>
-          <a:bodyPr>
-            <a:normAutofit/>
-          </a:bodyPr>
-          <a:lstStyle/>
-          <a:p>
-            <a:pPr algn="ctr"/>
-            <a:r>
-              <a:rPr lang="en-US" dirty="0">
-                <a:latin typeface="+mn-lt"/>
-                <a:cs typeface="Times New Roman" panose="02020603050405020304" pitchFamily="18" charset="0"/>
-              </a:rPr>
-              <a:t>Prerequisites</a:t>
-            </a:r>
-          </a:p>
-        </p:txBody>
-      </p:sp>
-      <p:sp>
-        <p:nvSpPr>
-          <p:cNvPr id="3" name="Content Placeholder 2">
-            <a:extLst>
-              <a:ext uri="{FF2B5EF4-FFF2-40B4-BE49-F238E27FC236}">
-                <a16:creationId xmlns:a16="http://schemas.microsoft.com/office/drawing/2014/main" id="{4696C7BD-FD93-F06F-CEAA-1DBDF1303D87}"/>
-              </a:ext>
-            </a:extLst>
-          </p:cNvPr>
-          <p:cNvSpPr>
-            <a:spLocks noGrp="1"/>
-          </p:cNvSpPr>
-          <p:nvPr>
-            <p:ph idx="1"/>
-          </p:nvPr>
-        </p:nvSpPr>
-        <p:spPr/>
-        <p:txBody>
-          <a:bodyPr>
-            <a:normAutofit/>
-          </a:bodyPr>
-          <a:lstStyle/>
-          <a:p>
-            <a:r>
-              <a:rPr lang="en-US" sz="2000" dirty="0">
-                <a:solidFill>
-                  <a:schemeClr val="tx1"/>
-                </a:solidFill>
-                <a:cs typeface="Times New Roman" panose="02020603050405020304" pitchFamily="18" charset="0"/>
-              </a:rPr>
-              <a:t>To use git more effectively it is always advised to know some basic commands of the Linux like </a:t>
-            </a:r>
-            <a:r>
-              <a:rPr lang="en-US" sz="2000" b="1" dirty="0">
-                <a:solidFill>
-                  <a:schemeClr val="tx1"/>
-                </a:solidFill>
-                <a:cs typeface="Times New Roman" panose="02020603050405020304" pitchFamily="18" charset="0"/>
-              </a:rPr>
-              <a:t>pwd, cd, ls</a:t>
-            </a:r>
-            <a:r>
-              <a:rPr lang="en-US" sz="2000" dirty="0">
-                <a:solidFill>
-                  <a:schemeClr val="tx1"/>
-                </a:solidFill>
-                <a:cs typeface="Times New Roman" panose="02020603050405020304" pitchFamily="18" charset="0"/>
-              </a:rPr>
-              <a:t> etc.</a:t>
-            </a:r>
-          </a:p>
-          <a:p>
-            <a:r>
-              <a:rPr lang="en-US" sz="2000" dirty="0">
-                <a:solidFill>
-                  <a:schemeClr val="tx1"/>
-                </a:solidFill>
-                <a:cs typeface="Times New Roman" panose="02020603050405020304" pitchFamily="18" charset="0"/>
-              </a:rPr>
-              <a:t>Git should be installed in a machine.</a:t>
-            </a:r>
-          </a:p>
-        </p:txBody>
-      </p:sp>
-    </p:spTree>
-    <p:extLst>
-      <p:ext uri="{BB962C8B-B14F-4D97-AF65-F5344CB8AC3E}">
-        <p14:creationId xmlns:p14="http://schemas.microsoft.com/office/powerpoint/2010/main" val="4026250420"/>
-      </p:ext>
-    </p:extLst>
-  </p:cSld>
-  <p:clrMapOvr>
-    <a:masterClrMapping/>
-  </p:clrMapOvr>
-</p:sld>
-</file>
-
-<file path=ppt/slides/slide6.xml><?xml version="1.0" encoding="utf-8"?>
-<p:sld xmlns:a="http://schemas.openxmlformats.org/drawingml/2006/main" xmlns:r="http://schemas.openxmlformats.org/officeDocument/2006/relationships" xmlns:p="http://schemas.openxmlformats.org/presentationml/2006/main">
-  <p:cSld>
-    <p:spTree>
-      <p:nvGrpSpPr>
-        <p:cNvPr id="1" name=""/>
-        <p:cNvGrpSpPr/>
-        <p:nvPr/>
-      </p:nvGrpSpPr>
-      <p:grpSpPr>
-        <a:xfrm>
-          <a:off x="0" y="0"/>
-          <a:ext cx="0" cy="0"/>
-          <a:chOff x="0" y="0"/>
-          <a:chExt cx="0" cy="0"/>
-        </a:xfrm>
-      </p:grpSpPr>
-      <p:sp>
-        <p:nvSpPr>
-          <p:cNvPr id="2" name="Title 1">
-            <a:extLst>
-              <a:ext uri="{FF2B5EF4-FFF2-40B4-BE49-F238E27FC236}">
                 <a16:creationId xmlns:a16="http://schemas.microsoft.com/office/drawing/2014/main" id="{001CDD81-543A-3713-2ABD-C9C72BF17CD0}"/>
               </a:ext>
             </a:extLst>
@@ -18437,7 +18309,7 @@
 </p:sld>
 </file>
 
-<file path=ppt/slides/slide7.xml><?xml version="1.0" encoding="utf-8"?>
+<file path=ppt/slides/slide6.xml><?xml version="1.0" encoding="utf-8"?>
 <p:sld xmlns:a="http://schemas.openxmlformats.org/drawingml/2006/main" xmlns:r="http://schemas.openxmlformats.org/officeDocument/2006/relationships" xmlns:p="http://schemas.openxmlformats.org/presentationml/2006/main">
   <p:cSld>
     <p:spTree>
@@ -19082,6 +18954,144 @@
 </p:sld>
 </file>
 
+<file path=ppt/slides/slide7.xml><?xml version="1.0" encoding="utf-8"?>
+<p:sld xmlns:a="http://schemas.openxmlformats.org/drawingml/2006/main" xmlns:r="http://schemas.openxmlformats.org/officeDocument/2006/relationships" xmlns:p="http://schemas.openxmlformats.org/presentationml/2006/main">
+  <p:cSld>
+    <p:spTree>
+      <p:nvGrpSpPr>
+        <p:cNvPr id="1" name=""/>
+        <p:cNvGrpSpPr/>
+        <p:nvPr/>
+      </p:nvGrpSpPr>
+      <p:grpSpPr>
+        <a:xfrm>
+          <a:off x="0" y="0"/>
+          <a:ext cx="0" cy="0"/>
+          <a:chOff x="0" y="0"/>
+          <a:chExt cx="0" cy="0"/>
+        </a:xfrm>
+      </p:grpSpPr>
+      <p:sp>
+        <p:nvSpPr>
+          <p:cNvPr id="2" name="Title 1">
+            <a:extLst>
+              <a:ext uri="{FF2B5EF4-FFF2-40B4-BE49-F238E27FC236}">
+                <a16:creationId xmlns:a16="http://schemas.microsoft.com/office/drawing/2014/main" id="{D55BD502-81BA-B8BF-5F91-F05FFA669785}"/>
+              </a:ext>
+            </a:extLst>
+          </p:cNvPr>
+          <p:cNvSpPr>
+            <a:spLocks noGrp="1"/>
+          </p:cNvSpPr>
+          <p:nvPr>
+            <p:ph type="title"/>
+          </p:nvPr>
+        </p:nvSpPr>
+        <p:spPr/>
+        <p:txBody>
+          <a:bodyPr/>
+          <a:lstStyle/>
+          <a:p>
+            <a:pPr algn="ctr"/>
+            <a:r>
+              <a:rPr lang="en-US" dirty="0"/>
+              <a:t>Basic command</a:t>
+            </a:r>
+          </a:p>
+        </p:txBody>
+      </p:sp>
+      <p:sp>
+        <p:nvSpPr>
+          <p:cNvPr id="4" name="Content Placeholder 3">
+            <a:extLst>
+              <a:ext uri="{FF2B5EF4-FFF2-40B4-BE49-F238E27FC236}">
+                <a16:creationId xmlns:a16="http://schemas.microsoft.com/office/drawing/2014/main" id="{AB769CEB-D8DC-9E5A-0562-31A9427E6C3C}"/>
+              </a:ext>
+            </a:extLst>
+          </p:cNvPr>
+          <p:cNvSpPr>
+            <a:spLocks noGrp="1"/>
+          </p:cNvSpPr>
+          <p:nvPr>
+            <p:ph sz="half" idx="2"/>
+          </p:nvPr>
+        </p:nvSpPr>
+        <p:spPr/>
+        <p:txBody>
+          <a:bodyPr>
+            <a:normAutofit/>
+          </a:bodyPr>
+          <a:lstStyle/>
+          <a:p>
+            <a:pPr marL="457200" indent="-457200">
+              <a:buFont typeface="+mj-lt"/>
+              <a:buAutoNum type="arabicPeriod"/>
+            </a:pPr>
+            <a:r>
+              <a:rPr lang="en-US" sz="2000" b="1" dirty="0">
+                <a:solidFill>
+                  <a:schemeClr val="tx1"/>
+                </a:solidFill>
+              </a:rPr>
+              <a:t>git status</a:t>
+            </a:r>
+          </a:p>
+        </p:txBody>
+      </p:sp>
+      <p:sp>
+        <p:nvSpPr>
+          <p:cNvPr id="6" name="Content Placeholder 5">
+            <a:extLst>
+              <a:ext uri="{FF2B5EF4-FFF2-40B4-BE49-F238E27FC236}">
+                <a16:creationId xmlns:a16="http://schemas.microsoft.com/office/drawing/2014/main" id="{6FA7F7F2-C48B-F038-8789-14EF4844C08B}"/>
+              </a:ext>
+            </a:extLst>
+          </p:cNvPr>
+          <p:cNvSpPr>
+            <a:spLocks noGrp="1"/>
+          </p:cNvSpPr>
+          <p:nvPr>
+            <p:ph sz="quarter" idx="4"/>
+          </p:nvPr>
+        </p:nvSpPr>
+        <p:spPr/>
+        <p:txBody>
+          <a:bodyPr>
+            <a:normAutofit/>
+          </a:bodyPr>
+          <a:lstStyle/>
+          <a:p>
+            <a:r>
+              <a:rPr lang="en-US" sz="2000" dirty="0">
+                <a:solidFill>
+                  <a:schemeClr val="tx1"/>
+                </a:solidFill>
+              </a:rPr>
+              <a:t>To check whether we are in any git repository or not. If we are there is there anything we have to stage or commit.</a:t>
+            </a:r>
+          </a:p>
+          <a:p>
+            <a:endParaRPr lang="en-US" sz="2000" dirty="0">
+              <a:solidFill>
+                <a:schemeClr val="tx1"/>
+              </a:solidFill>
+            </a:endParaRPr>
+          </a:p>
+        </p:txBody>
+      </p:sp>
+    </p:spTree>
+    <p:extLst>
+      <p:ext uri="{BB962C8B-B14F-4D97-AF65-F5344CB8AC3E}">
+        <p14:creationId xmlns:p14="http://schemas.microsoft.com/office/powerpoint/2010/main" val="3907822393"/>
+      </p:ext>
+    </p:extLst>
+  </p:cSld>
+  <p:clrMapOvr>
+    <a:masterClrMapping/>
+  </p:clrMapOvr>
+</p:sld>
+</file>
+
 <file path=ppt/slides/slide8.xml><?xml version="1.0" encoding="utf-8"?>
 <p:sld xmlns:a="http://schemas.openxmlformats.org/drawingml/2006/main" xmlns:r="http://schemas.openxmlformats.org/officeDocument/2006/relationships" xmlns:p="http://schemas.openxmlformats.org/presentationml/2006/main">
   <p:cSld>
@@ -19104,7 +19114,7 @@
           <p:cNvPr id="2" name="Title 1">
             <a:extLst>
               <a:ext uri="{FF2B5EF4-FFF2-40B4-BE49-F238E27FC236}">
-                <a16:creationId xmlns:a16="http://schemas.microsoft.com/office/drawing/2014/main" id="{D55BD502-81BA-B8BF-5F91-F05FFA669785}"/>
+                <a16:creationId xmlns:a16="http://schemas.microsoft.com/office/drawing/2014/main" id="{EB68CE3D-CC89-6EDC-F8B5-3118977A59AD}"/>
               </a:ext>
             </a:extLst>
           </p:cNvPr>
@@ -19123,7 +19133,11 @@
             <a:pPr algn="ctr"/>
             <a:r>
               <a:rPr lang="en-US" dirty="0"/>
-              <a:t>Basic command</a:t>
+              <a:t>Basic flow to create </a:t>
+            </a:r>
+            <a:r>
+              <a:rPr lang="en-US" b="1" dirty="0"/>
+              <a:t>git repository</a:t>
             </a:r>
           </a:p>
         </p:txBody>
@@ -19133,7 +19147,7 @@
           <p:cNvPr id="4" name="Content Placeholder 3">
             <a:extLst>
               <a:ext uri="{FF2B5EF4-FFF2-40B4-BE49-F238E27FC236}">
-                <a16:creationId xmlns:a16="http://schemas.microsoft.com/office/drawing/2014/main" id="{AB769CEB-D8DC-9E5A-0562-31A9427E6C3C}"/>
+                <a16:creationId xmlns:a16="http://schemas.microsoft.com/office/drawing/2014/main" id="{C1C5EC90-E992-76B4-C1C6-02CCC1A97E0D}"/>
               </a:ext>
             </a:extLst>
           </p:cNvPr>
@@ -19144,7 +19158,12 @@
             <p:ph sz="half" idx="2"/>
           </p:nvPr>
         </p:nvSpPr>
-        <p:spPr/>
+        <p:spPr>
+          <a:xfrm>
+            <a:off x="675745" y="2737245"/>
+            <a:ext cx="4486805" cy="3304117"/>
+          </a:xfrm>
+        </p:spPr>
         <p:txBody>
           <a:bodyPr>
             <a:normAutofit/>
@@ -19161,7 +19180,103 @@
                   <a:schemeClr val="tx1"/>
                 </a:solidFill>
               </a:rPr>
-              <a:t>git status</a:t>
+              <a:t>git </a:t>
+            </a:r>
+            <a:r>
+              <a:rPr lang="en-US" sz="2000" b="1" dirty="0" err="1">
+                <a:solidFill>
+                  <a:schemeClr val="tx1"/>
+                </a:solidFill>
+              </a:rPr>
+              <a:t>init</a:t>
+            </a:r>
+            <a:endParaRPr lang="en-US" sz="2000" b="1" dirty="0">
+              <a:solidFill>
+                <a:schemeClr val="tx1"/>
+              </a:solidFill>
+            </a:endParaRPr>
+          </a:p>
+          <a:p>
+            <a:pPr marL="457200" indent="-457200">
+              <a:buFont typeface="+mj-lt"/>
+              <a:buAutoNum type="arabicPeriod"/>
+            </a:pPr>
+            <a:r>
+              <a:rPr lang="en-US" sz="2000" b="1" dirty="0">
+                <a:solidFill>
+                  <a:schemeClr val="tx1"/>
+                </a:solidFill>
+              </a:rPr>
+              <a:t>git add </a:t>
+            </a:r>
+            <a:r>
+              <a:rPr lang="en-US" sz="2000" b="1" dirty="0" err="1">
+                <a:solidFill>
+                  <a:schemeClr val="tx1"/>
+                </a:solidFill>
+              </a:rPr>
+              <a:t>filename.extension</a:t>
+            </a:r>
+            <a:endParaRPr lang="en-US" sz="2000" b="1" dirty="0">
+              <a:solidFill>
+                <a:schemeClr val="tx1"/>
+              </a:solidFill>
+            </a:endParaRPr>
+          </a:p>
+          <a:p>
+            <a:pPr marL="457200" indent="-457200">
+              <a:buFont typeface="+mj-lt"/>
+              <a:buAutoNum type="arabicPeriod"/>
+            </a:pPr>
+            <a:r>
+              <a:rPr lang="en-US" sz="2000" b="1" dirty="0">
+                <a:solidFill>
+                  <a:schemeClr val="tx1"/>
+                </a:solidFill>
+              </a:rPr>
+              <a:t>git add --a or git add . </a:t>
+            </a:r>
+          </a:p>
+          <a:p>
+            <a:pPr marL="457200" indent="-457200">
+              <a:buFont typeface="+mj-lt"/>
+              <a:buAutoNum type="arabicPeriod"/>
+            </a:pPr>
+            <a:r>
+              <a:rPr lang="en-US" sz="2000" b="1" dirty="0">
+                <a:solidFill>
+                  <a:schemeClr val="tx1"/>
+                </a:solidFill>
+              </a:rPr>
+              <a:t>git commit –m “Initial Commit”</a:t>
+            </a:r>
+          </a:p>
+          <a:p>
+            <a:pPr marL="457200" indent="-457200">
+              <a:buFont typeface="+mj-lt"/>
+              <a:buAutoNum type="arabicPeriod"/>
+            </a:pPr>
+            <a:r>
+              <a:rPr lang="en-US" sz="2000" b="1" dirty="0">
+                <a:solidFill>
+                  <a:schemeClr val="tx1"/>
+                </a:solidFill>
+              </a:rPr>
+              <a:t>git log</a:t>
+            </a:r>
+          </a:p>
+          <a:p>
+            <a:pPr marL="457200" indent="-457200">
+              <a:buFont typeface="+mj-lt"/>
+              <a:buAutoNum type="arabicPeriod"/>
+            </a:pPr>
+            <a:r>
+              <a:rPr lang="en-US" sz="2000" b="1" dirty="0">
+                <a:solidFill>
+                  <a:schemeClr val="tx1"/>
+                </a:solidFill>
+              </a:rPr>
+              <a:t>rm –rf (folder name)</a:t>
             </a:r>
           </a:p>
         </p:txBody>
@@ -19171,7 +19286,7 @@
           <p:cNvPr id="6" name="Content Placeholder 5">
             <a:extLst>
               <a:ext uri="{FF2B5EF4-FFF2-40B4-BE49-F238E27FC236}">
-                <a16:creationId xmlns:a16="http://schemas.microsoft.com/office/drawing/2014/main" id="{6FA7F7F2-C48B-F038-8789-14EF4844C08B}"/>
+                <a16:creationId xmlns:a16="http://schemas.microsoft.com/office/drawing/2014/main" id="{66CE98CD-0B3C-01EA-5AB8-FA0B63613469}"/>
               </a:ext>
             </a:extLst>
           </p:cNvPr>
@@ -19182,7 +19297,12 @@
             <p:ph sz="quarter" idx="4"/>
           </p:nvPr>
         </p:nvSpPr>
-        <p:spPr/>
+        <p:spPr>
+          <a:xfrm>
+            <a:off x="5088384" y="2737245"/>
+            <a:ext cx="7103616" cy="3304117"/>
+          </a:xfrm>
+        </p:spPr>
         <p:txBody>
           <a:bodyPr>
             <a:normAutofit/>
@@ -19195,22 +19315,65 @@
                   <a:schemeClr val="tx1"/>
                 </a:solidFill>
               </a:rPr>
-              <a:t>To check whether we are in any git repository or not. If we are there is there anything we have to stage or commit.</a:t>
-            </a:r>
-          </a:p>
-          <a:p>
-            <a:endParaRPr lang="en-US" sz="2000" dirty="0">
-              <a:solidFill>
-                <a:schemeClr val="tx1"/>
-              </a:solidFill>
-            </a:endParaRPr>
+              <a:t>Repository is created(.git folder)(hidden folder)</a:t>
+            </a:r>
+          </a:p>
+          <a:p>
+            <a:r>
+              <a:rPr lang="en-US" sz="2000" dirty="0">
+                <a:solidFill>
+                  <a:schemeClr val="tx1"/>
+                </a:solidFill>
+              </a:rPr>
+              <a:t>To add a particular file in a staging area </a:t>
+            </a:r>
+          </a:p>
+          <a:p>
+            <a:r>
+              <a:rPr lang="en-US" sz="2000" dirty="0">
+                <a:solidFill>
+                  <a:schemeClr val="tx1"/>
+                </a:solidFill>
+              </a:rPr>
+              <a:t>Add all files to staging area</a:t>
+            </a:r>
+          </a:p>
+          <a:p>
+            <a:r>
+              <a:rPr lang="en-US" sz="2000" dirty="0">
+                <a:solidFill>
+                  <a:schemeClr val="tx1"/>
+                </a:solidFill>
+              </a:rPr>
+              <a:t>To commit and to give a comment to a changes</a:t>
+            </a:r>
+          </a:p>
+          <a:p>
+            <a:r>
+              <a:rPr lang="en-US" sz="2000" dirty="0">
+                <a:solidFill>
+                  <a:schemeClr val="tx1"/>
+                </a:solidFill>
+              </a:rPr>
+              <a:t>It is used to know no. of previous commit done</a:t>
+            </a:r>
+          </a:p>
+          <a:p>
+            <a:r>
+              <a:rPr lang="en-US" sz="2000" dirty="0">
+                <a:solidFill>
+                  <a:schemeClr val="tx1"/>
+                </a:solidFill>
+              </a:rPr>
+              <a:t>To delete any folder</a:t>
+            </a:r>
           </a:p>
         </p:txBody>
       </p:sp>
     </p:spTree>
     <p:extLst>
       <p:ext uri="{BB962C8B-B14F-4D97-AF65-F5344CB8AC3E}">
-        <p14:creationId xmlns:p14="http://schemas.microsoft.com/office/powerpoint/2010/main" val="3907822393"/>
+        <p14:creationId xmlns:p14="http://schemas.microsoft.com/office/powerpoint/2010/main" val="1964965250"/>
       </p:ext>
     </p:extLst>
   </p:cSld>
@@ -19242,7 +19405,7 @@
           <p:cNvPr id="2" name="Title 1">
             <a:extLst>
               <a:ext uri="{FF2B5EF4-FFF2-40B4-BE49-F238E27FC236}">
-                <a16:creationId xmlns:a16="http://schemas.microsoft.com/office/drawing/2014/main" id="{EB68CE3D-CC89-6EDC-F8B5-3118977A59AD}"/>
+                <a16:creationId xmlns:a16="http://schemas.microsoft.com/office/drawing/2014/main" id="{2D6F5181-1625-3335-5685-9DEBC9C63E2D}"/>
               </a:ext>
             </a:extLst>
           </p:cNvPr>
@@ -19261,11 +19424,7 @@
             <a:pPr algn="ctr"/>
             <a:r>
               <a:rPr lang="en-US" dirty="0"/>
-              <a:t>Basic flow to create </a:t>
-            </a:r>
-            <a:r>
-              <a:rPr lang="en-US" b="1" dirty="0"/>
-              <a:t>git repository</a:t>
+              <a:t>Other command</a:t>
             </a:r>
           </a:p>
         </p:txBody>
@@ -19275,7 +19434,7 @@
           <p:cNvPr id="4" name="Content Placeholder 3">
             <a:extLst>
               <a:ext uri="{FF2B5EF4-FFF2-40B4-BE49-F238E27FC236}">
-                <a16:creationId xmlns:a16="http://schemas.microsoft.com/office/drawing/2014/main" id="{C1C5EC90-E992-76B4-C1C6-02CCC1A97E0D}"/>
+                <a16:creationId xmlns:a16="http://schemas.microsoft.com/office/drawing/2014/main" id="{A543A87A-F3D3-EA4C-79CA-76BA4A7D3E0C}"/>
               </a:ext>
             </a:extLst>
           </p:cNvPr>
@@ -19286,12 +19445,7 @@
             <p:ph sz="half" idx="2"/>
           </p:nvPr>
         </p:nvSpPr>
-        <p:spPr>
-          <a:xfrm>
-            <a:off x="675745" y="2737245"/>
-            <a:ext cx="4486805" cy="3304117"/>
-          </a:xfrm>
-        </p:spPr>
+        <p:spPr/>
         <p:txBody>
           <a:bodyPr>
             <a:normAutofit/>
@@ -19308,103 +19462,7 @@
                   <a:schemeClr val="tx1"/>
                 </a:solidFill>
               </a:rPr>
-              <a:t>git </a:t>
-            </a:r>
-            <a:r>
-              <a:rPr lang="en-US" sz="2000" b="1" dirty="0" err="1">
-                <a:solidFill>
-                  <a:schemeClr val="tx1"/>
-                </a:solidFill>
-              </a:rPr>
-              <a:t>init</a:t>
-            </a:r>
-            <a:endParaRPr lang="en-US" sz="2000" b="1" dirty="0">
-              <a:solidFill>
-                <a:schemeClr val="tx1"/>
-              </a:solidFill>
-            </a:endParaRPr>
-          </a:p>
-          <a:p>
-            <a:pPr marL="457200" indent="-457200">
-              <a:buFont typeface="+mj-lt"/>
-              <a:buAutoNum type="arabicPeriod"/>
-            </a:pPr>
-            <a:r>
-              <a:rPr lang="en-US" sz="2000" b="1" dirty="0">
-                <a:solidFill>
-                  <a:schemeClr val="tx1"/>
-                </a:solidFill>
-              </a:rPr>
-              <a:t>git add </a:t>
-            </a:r>
-            <a:r>
-              <a:rPr lang="en-US" sz="2000" b="1" dirty="0" err="1">
-                <a:solidFill>
-                  <a:schemeClr val="tx1"/>
-                </a:solidFill>
-              </a:rPr>
-              <a:t>filename.extension</a:t>
-            </a:r>
-            <a:endParaRPr lang="en-US" sz="2000" b="1" dirty="0">
-              <a:solidFill>
-                <a:schemeClr val="tx1"/>
-              </a:solidFill>
-            </a:endParaRPr>
-          </a:p>
-          <a:p>
-            <a:pPr marL="457200" indent="-457200">
-              <a:buFont typeface="+mj-lt"/>
-              <a:buAutoNum type="arabicPeriod"/>
-            </a:pPr>
-            <a:r>
-              <a:rPr lang="en-US" sz="2000" b="1" dirty="0">
-                <a:solidFill>
-                  <a:schemeClr val="tx1"/>
-                </a:solidFill>
-              </a:rPr>
-              <a:t>git add --a or git add . </a:t>
-            </a:r>
-          </a:p>
-          <a:p>
-            <a:pPr marL="457200" indent="-457200">
-              <a:buFont typeface="+mj-lt"/>
-              <a:buAutoNum type="arabicPeriod"/>
-            </a:pPr>
-            <a:r>
-              <a:rPr lang="en-US" sz="2000" b="1" dirty="0">
-                <a:solidFill>
-                  <a:schemeClr val="tx1"/>
-                </a:solidFill>
-              </a:rPr>
-              <a:t>git commit –m “Initial Commit”</a:t>
-            </a:r>
-          </a:p>
-          <a:p>
-            <a:pPr marL="457200" indent="-457200">
-              <a:buFont typeface="+mj-lt"/>
-              <a:buAutoNum type="arabicPeriod"/>
-            </a:pPr>
-            <a:r>
-              <a:rPr lang="en-US" sz="2000" b="1" dirty="0">
-                <a:solidFill>
-                  <a:schemeClr val="tx1"/>
-                </a:solidFill>
-              </a:rPr>
-              <a:t>git log</a:t>
-            </a:r>
-          </a:p>
-          <a:p>
-            <a:pPr marL="457200" indent="-457200">
-              <a:buFont typeface="+mj-lt"/>
-              <a:buAutoNum type="arabicPeriod"/>
-            </a:pPr>
-            <a:r>
-              <a:rPr lang="en-US" sz="2000" b="1" dirty="0">
-                <a:solidFill>
-                  <a:schemeClr val="tx1"/>
-                </a:solidFill>
-              </a:rPr>
-              <a:t>rm –rf (folder name)</a:t>
+              <a:t>git clone (link(copy paste))</a:t>
             </a:r>
           </a:p>
         </p:txBody>
@@ -19414,7 +19472,7 @@
           <p:cNvPr id="6" name="Content Placeholder 5">
             <a:extLst>
               <a:ext uri="{FF2B5EF4-FFF2-40B4-BE49-F238E27FC236}">
-                <a16:creationId xmlns:a16="http://schemas.microsoft.com/office/drawing/2014/main" id="{66CE98CD-0B3C-01EA-5AB8-FA0B63613469}"/>
+                <a16:creationId xmlns:a16="http://schemas.microsoft.com/office/drawing/2014/main" id="{B0EC5ACA-21C0-1EAF-FA95-4DF2F83F7C33}"/>
               </a:ext>
             </a:extLst>
           </p:cNvPr>
@@ -19428,7 +19486,7 @@
         <p:spPr>
           <a:xfrm>
             <a:off x="5088384" y="2737245"/>
-            <a:ext cx="7103616" cy="3304117"/>
+            <a:ext cx="6894066" cy="3304117"/>
           </a:xfrm>
         </p:spPr>
         <p:txBody>
@@ -19443,57 +19501,7 @@
                   <a:schemeClr val="tx1"/>
                 </a:solidFill>
               </a:rPr>
-              <a:t>Repository is created(.git folder)(hidden folder)</a:t>
-            </a:r>
-          </a:p>
-          <a:p>
-            <a:r>
-              <a:rPr lang="en-US" sz="2000" dirty="0">
-                <a:solidFill>
-                  <a:schemeClr val="tx1"/>
-                </a:solidFill>
-              </a:rPr>
-              <a:t>To add a particular file in a staging area </a:t>
-            </a:r>
-          </a:p>
-          <a:p>
-            <a:r>
-              <a:rPr lang="en-US" sz="2000" dirty="0">
-                <a:solidFill>
-                  <a:schemeClr val="tx1"/>
-                </a:solidFill>
-              </a:rPr>
-              <a:t>Add all files to staging area</a:t>
-            </a:r>
-          </a:p>
-          <a:p>
-            <a:r>
-              <a:rPr lang="en-US" sz="2000" dirty="0">
-                <a:solidFill>
-                  <a:schemeClr val="tx1"/>
-                </a:solidFill>
-              </a:rPr>
-              <a:t>To commit and to give a comment to a changes</a:t>
-            </a:r>
-          </a:p>
-          <a:p>
-            <a:r>
-              <a:rPr lang="en-US" sz="2000" dirty="0">
-                <a:solidFill>
-                  <a:schemeClr val="tx1"/>
-                </a:solidFill>
-              </a:rPr>
-              <a:t>It is used to know no. of previous commit done</a:t>
-            </a:r>
-          </a:p>
-          <a:p>
-            <a:r>
-              <a:rPr lang="en-US" sz="2000" dirty="0">
-                <a:solidFill>
-                  <a:schemeClr val="tx1"/>
-                </a:solidFill>
-              </a:rPr>
-              <a:t>To delete any folder</a:t>
+              <a:t>To copy existing repository to your repository</a:t>
             </a:r>
           </a:p>
         </p:txBody>
@@ -19501,7 +19509,7 @@
     </p:spTree>
     <p:extLst>
       <p:ext uri="{BB962C8B-B14F-4D97-AF65-F5344CB8AC3E}">
-        <p14:creationId xmlns:p14="http://schemas.microsoft.com/office/powerpoint/2010/main" val="1964965250"/>
+        <p14:creationId xmlns:p14="http://schemas.microsoft.com/office/powerpoint/2010/main" val="2999541459"/>
       </p:ext>
     </p:extLst>
   </p:cSld>

</xml_diff>

<commit_message>
Final commit of RTOS_streetLight_task
</commit_message>
<xml_diff>
--- a/PPTs and other documents related to training/Git & GitHub.pptx
+++ b/PPTs and other documents related to training/Git & GitHub.pptx
@@ -1705,6 +1705,30 @@
       </pc:sldChg>
     </pc:docChg>
   </pc:docChgLst>
+  <pc:docChgLst>
+    <pc:chgData name="Shrey Bechara" userId="9059411d-b244-4d27-ad8a-c685a7523656" providerId="ADAL" clId="{EBDF8D01-F811-47D7-B32C-14B4F1E8C060}"/>
+    <pc:docChg chg="modSld">
+      <pc:chgData name="Shrey Bechara" userId="9059411d-b244-4d27-ad8a-c685a7523656" providerId="ADAL" clId="{EBDF8D01-F811-47D7-B32C-14B4F1E8C060}" dt="2023-08-28T11:50:43.796" v="0" actId="1076"/>
+      <pc:docMkLst>
+        <pc:docMk/>
+      </pc:docMkLst>
+      <pc:sldChg chg="modSp mod">
+        <pc:chgData name="Shrey Bechara" userId="9059411d-b244-4d27-ad8a-c685a7523656" providerId="ADAL" clId="{EBDF8D01-F811-47D7-B32C-14B4F1E8C060}" dt="2023-08-28T11:50:43.796" v="0" actId="1076"/>
+        <pc:sldMkLst>
+          <pc:docMk/>
+          <pc:sldMk cId="4026250420" sldId="260"/>
+        </pc:sldMkLst>
+        <pc:spChg chg="mod">
+          <ac:chgData name="Shrey Bechara" userId="9059411d-b244-4d27-ad8a-c685a7523656" providerId="ADAL" clId="{EBDF8D01-F811-47D7-B32C-14B4F1E8C060}" dt="2023-08-28T11:50:43.796" v="0" actId="1076"/>
+          <ac:spMkLst>
+            <pc:docMk/>
+            <pc:sldMk cId="4026250420" sldId="260"/>
+            <ac:spMk id="2" creationId="{C566ADFD-99F0-C9A1-3DC1-57CAEB3749CA}"/>
+          </ac:spMkLst>
+        </pc:spChg>
+      </pc:sldChg>
+    </pc:docChg>
+  </pc:docChgLst>
 </pc:chgInfo>
 </file>
 
@@ -2453,7 +2477,7 @@
           <a:p>
             <a:fld id="{3135B033-1102-448D-AE9C-09FAF647E837}" type="datetimeFigureOut">
               <a:rPr lang="en-US" smtClean="0"/>
-              <a:t>6/5/2023</a:t>
+              <a:t>8/28/2023</a:t>
             </a:fld>
             <a:endParaRPr lang="en-US"/>
           </a:p>
@@ -2704,7 +2728,7 @@
           <a:p>
             <a:fld id="{3135B033-1102-448D-AE9C-09FAF647E837}" type="datetimeFigureOut">
               <a:rPr lang="en-US" smtClean="0"/>
-              <a:t>6/5/2023</a:t>
+              <a:t>8/28/2023</a:t>
             </a:fld>
             <a:endParaRPr lang="en-US"/>
           </a:p>
@@ -3018,7 +3042,7 @@
           <a:p>
             <a:fld id="{3135B033-1102-448D-AE9C-09FAF647E837}" type="datetimeFigureOut">
               <a:rPr lang="en-US" smtClean="0"/>
-              <a:t>6/5/2023</a:t>
+              <a:t>8/28/2023</a:t>
             </a:fld>
             <a:endParaRPr lang="en-US"/>
           </a:p>
@@ -3351,7 +3375,7 @@
           <a:p>
             <a:fld id="{3135B033-1102-448D-AE9C-09FAF647E837}" type="datetimeFigureOut">
               <a:rPr lang="en-US" smtClean="0"/>
-              <a:t>6/5/2023</a:t>
+              <a:t>8/28/2023</a:t>
             </a:fld>
             <a:endParaRPr lang="en-US"/>
           </a:p>
@@ -3665,7 +3689,7 @@
           <a:p>
             <a:fld id="{3135B033-1102-448D-AE9C-09FAF647E837}" type="datetimeFigureOut">
               <a:rPr lang="en-US" smtClean="0"/>
-              <a:t>6/5/2023</a:t>
+              <a:t>8/28/2023</a:t>
             </a:fld>
             <a:endParaRPr lang="en-US"/>
           </a:p>
@@ -4058,7 +4082,7 @@
           <a:p>
             <a:fld id="{3135B033-1102-448D-AE9C-09FAF647E837}" type="datetimeFigureOut">
               <a:rPr lang="en-US" smtClean="0"/>
-              <a:t>6/5/2023</a:t>
+              <a:t>8/28/2023</a:t>
             </a:fld>
             <a:endParaRPr lang="en-US"/>
           </a:p>
@@ -4228,7 +4252,7 @@
           <a:p>
             <a:fld id="{3135B033-1102-448D-AE9C-09FAF647E837}" type="datetimeFigureOut">
               <a:rPr lang="en-US" smtClean="0"/>
-              <a:t>6/5/2023</a:t>
+              <a:t>8/28/2023</a:t>
             </a:fld>
             <a:endParaRPr lang="en-US"/>
           </a:p>
@@ -4408,7 +4432,7 @@
           <a:p>
             <a:fld id="{3135B033-1102-448D-AE9C-09FAF647E837}" type="datetimeFigureOut">
               <a:rPr lang="en-US" smtClean="0"/>
-              <a:t>6/5/2023</a:t>
+              <a:t>8/28/2023</a:t>
             </a:fld>
             <a:endParaRPr lang="en-US"/>
           </a:p>
@@ -4578,7 +4602,7 @@
           <a:p>
             <a:fld id="{3135B033-1102-448D-AE9C-09FAF647E837}" type="datetimeFigureOut">
               <a:rPr lang="en-US" smtClean="0"/>
-              <a:t>6/5/2023</a:t>
+              <a:t>8/28/2023</a:t>
             </a:fld>
             <a:endParaRPr lang="en-US"/>
           </a:p>
@@ -4825,7 +4849,7 @@
           <a:p>
             <a:fld id="{3135B033-1102-448D-AE9C-09FAF647E837}" type="datetimeFigureOut">
               <a:rPr lang="en-US" smtClean="0"/>
-              <a:t>6/5/2023</a:t>
+              <a:t>8/28/2023</a:t>
             </a:fld>
             <a:endParaRPr lang="en-US"/>
           </a:p>
@@ -5057,7 +5081,7 @@
           <a:p>
             <a:fld id="{3135B033-1102-448D-AE9C-09FAF647E837}" type="datetimeFigureOut">
               <a:rPr lang="en-US" smtClean="0"/>
-              <a:t>6/5/2023</a:t>
+              <a:t>8/28/2023</a:t>
             </a:fld>
             <a:endParaRPr lang="en-US"/>
           </a:p>
@@ -5431,7 +5455,7 @@
           <a:p>
             <a:fld id="{3135B033-1102-448D-AE9C-09FAF647E837}" type="datetimeFigureOut">
               <a:rPr lang="en-US" smtClean="0"/>
-              <a:t>6/5/2023</a:t>
+              <a:t>8/28/2023</a:t>
             </a:fld>
             <a:endParaRPr lang="en-US"/>
           </a:p>
@@ -5554,7 +5578,7 @@
           <a:p>
             <a:fld id="{3135B033-1102-448D-AE9C-09FAF647E837}" type="datetimeFigureOut">
               <a:rPr lang="en-US" smtClean="0"/>
-              <a:t>6/5/2023</a:t>
+              <a:t>8/28/2023</a:t>
             </a:fld>
             <a:endParaRPr lang="en-US"/>
           </a:p>
@@ -5649,7 +5673,7 @@
           <a:p>
             <a:fld id="{3135B033-1102-448D-AE9C-09FAF647E837}" type="datetimeFigureOut">
               <a:rPr lang="en-US" smtClean="0"/>
-              <a:t>6/5/2023</a:t>
+              <a:t>8/28/2023</a:t>
             </a:fld>
             <a:endParaRPr lang="en-US"/>
           </a:p>
@@ -5904,7 +5928,7 @@
           <a:p>
             <a:fld id="{3135B033-1102-448D-AE9C-09FAF647E837}" type="datetimeFigureOut">
               <a:rPr lang="en-US" smtClean="0"/>
-              <a:t>6/5/2023</a:t>
+              <a:t>8/28/2023</a:t>
             </a:fld>
             <a:endParaRPr lang="en-US"/>
           </a:p>
@@ -6209,7 +6233,7 @@
           <a:p>
             <a:fld id="{3135B033-1102-448D-AE9C-09FAF647E837}" type="datetimeFigureOut">
               <a:rPr lang="en-US" smtClean="0"/>
-              <a:t>6/5/2023</a:t>
+              <a:t>8/28/2023</a:t>
             </a:fld>
             <a:endParaRPr lang="en-US"/>
           </a:p>
@@ -6911,7 +6935,7 @@
           <a:p>
             <a:fld id="{3135B033-1102-448D-AE9C-09FAF647E837}" type="datetimeFigureOut">
               <a:rPr lang="en-US" smtClean="0"/>
-              <a:t>6/5/2023</a:t>
+              <a:t>8/28/2023</a:t>
             </a:fld>
             <a:endParaRPr lang="en-US"/>
           </a:p>
@@ -18029,7 +18053,12 @@
             <p:ph type="title"/>
           </p:nvPr>
         </p:nvSpPr>
-        <p:spPr/>
+        <p:spPr>
+          <a:xfrm>
+            <a:off x="677334" y="589280"/>
+            <a:ext cx="8596668" cy="1320800"/>
+          </a:xfrm>
+        </p:spPr>
         <p:txBody>
           <a:bodyPr>
             <a:normAutofit/>

</xml_diff>